<commit_message>
Added compiled cmdlets demo code and first crack at slides
</commit_message>
<xml_diff>
--- a/Write Better Code/Write Better Code.pptx
+++ b/Write Better Code/Write Better Code.pptx
@@ -147,6 +147,535 @@
     </p:ext>
   </p:extLst>
 </p:presentation>
+</file>
+
+<file path=ppt/revisionInfo.xml><?xml version="1.0" encoding="utf-8"?>
+<p1510:revInfo xmlns:a="http://schemas.openxmlformats.org/drawingml/2006/main" xmlns:r="http://schemas.openxmlformats.org/officeDocument/2006/relationships" xmlns:p1510="http://schemas.microsoft.com/office/powerpoint/2015/10/main">
+  <p1510:revLst>
+    <p1510:client id="{0FEA48AA-DED2-4F2F-8AB8-DE5F4C76965C}" v="29" dt="2018-07-05T20:11:55.244"/>
+  </p1510:revLst>
+</p1510:revInfo>
+</file>
+
+<file path=ppt/changesInfos/changesInfo1.xml><?xml version="1.0" encoding="utf-8"?>
+<pc:chgInfo xmlns:a="http://schemas.openxmlformats.org/drawingml/2006/main" xmlns:r="http://schemas.openxmlformats.org/officeDocument/2006/relationships" xmlns:ac="http://schemas.microsoft.com/office/drawing/2013/main/command" xmlns:pc="http://schemas.microsoft.com/office/powerpoint/2013/main/command">
+  <pc:docChgLst>
+    <pc:chgData name="Thomas Rayner" userId="2a90c881cfb7e9fb" providerId="LiveId" clId="{0FEA48AA-DED2-4F2F-8AB8-DE5F4C76965C}"/>
+    <pc:docChg chg="undo custSel modSld modMainMaster">
+      <pc:chgData name="Thomas Rayner" userId="2a90c881cfb7e9fb" providerId="LiveId" clId="{0FEA48AA-DED2-4F2F-8AB8-DE5F4C76965C}" dt="2018-07-05T20:11:55.244" v="28"/>
+      <pc:docMkLst>
+        <pc:docMk/>
+      </pc:docMkLst>
+      <pc:sldChg chg="modSp">
+        <pc:chgData name="Thomas Rayner" userId="2a90c881cfb7e9fb" providerId="LiveId" clId="{0FEA48AA-DED2-4F2F-8AB8-DE5F4C76965C}" dt="2018-07-05T20:11:55.244" v="28"/>
+        <pc:sldMkLst>
+          <pc:docMk/>
+          <pc:sldMk cId="1967838518" sldId="257"/>
+        </pc:sldMkLst>
+        <pc:spChg chg="mod">
+          <ac:chgData name="Thomas Rayner" userId="2a90c881cfb7e9fb" providerId="LiveId" clId="{0FEA48AA-DED2-4F2F-8AB8-DE5F4C76965C}" dt="2018-07-05T20:11:55.244" v="28"/>
+          <ac:spMkLst>
+            <pc:docMk/>
+            <pc:sldMk cId="1967838518" sldId="257"/>
+            <ac:spMk id="2" creationId="{00000000-0000-0000-0000-000000000000}"/>
+          </ac:spMkLst>
+        </pc:spChg>
+        <pc:spChg chg="mod">
+          <ac:chgData name="Thomas Rayner" userId="2a90c881cfb7e9fb" providerId="LiveId" clId="{0FEA48AA-DED2-4F2F-8AB8-DE5F4C76965C}" dt="2018-07-05T20:11:55.244" v="28"/>
+          <ac:spMkLst>
+            <pc:docMk/>
+            <pc:sldMk cId="1967838518" sldId="257"/>
+            <ac:spMk id="3" creationId="{00000000-0000-0000-0000-000000000000}"/>
+          </ac:spMkLst>
+        </pc:spChg>
+      </pc:sldChg>
+      <pc:sldChg chg="modSp">
+        <pc:chgData name="Thomas Rayner" userId="2a90c881cfb7e9fb" providerId="LiveId" clId="{0FEA48AA-DED2-4F2F-8AB8-DE5F4C76965C}" dt="2018-07-05T20:11:55.244" v="28"/>
+        <pc:sldMkLst>
+          <pc:docMk/>
+          <pc:sldMk cId="3234306447" sldId="259"/>
+        </pc:sldMkLst>
+        <pc:spChg chg="mod">
+          <ac:chgData name="Thomas Rayner" userId="2a90c881cfb7e9fb" providerId="LiveId" clId="{0FEA48AA-DED2-4F2F-8AB8-DE5F4C76965C}" dt="2018-07-05T20:11:55.244" v="28"/>
+          <ac:spMkLst>
+            <pc:docMk/>
+            <pc:sldMk cId="3234306447" sldId="259"/>
+            <ac:spMk id="3" creationId="{00000000-0000-0000-0000-000000000000}"/>
+          </ac:spMkLst>
+        </pc:spChg>
+      </pc:sldChg>
+      <pc:sldChg chg="modSp">
+        <pc:chgData name="Thomas Rayner" userId="2a90c881cfb7e9fb" providerId="LiveId" clId="{0FEA48AA-DED2-4F2F-8AB8-DE5F4C76965C}" dt="2018-07-05T20:11:55.244" v="28"/>
+        <pc:sldMkLst>
+          <pc:docMk/>
+          <pc:sldMk cId="400032026" sldId="260"/>
+        </pc:sldMkLst>
+        <pc:spChg chg="mod">
+          <ac:chgData name="Thomas Rayner" userId="2a90c881cfb7e9fb" providerId="LiveId" clId="{0FEA48AA-DED2-4F2F-8AB8-DE5F4C76965C}" dt="2018-07-05T20:11:55.244" v="28"/>
+          <ac:spMkLst>
+            <pc:docMk/>
+            <pc:sldMk cId="400032026" sldId="260"/>
+            <ac:spMk id="3" creationId="{00000000-0000-0000-0000-000000000000}"/>
+          </ac:spMkLst>
+        </pc:spChg>
+      </pc:sldChg>
+      <pc:sldChg chg="modSp">
+        <pc:chgData name="Thomas Rayner" userId="2a90c881cfb7e9fb" providerId="LiveId" clId="{0FEA48AA-DED2-4F2F-8AB8-DE5F4C76965C}" dt="2018-07-05T20:11:55.244" v="28"/>
+        <pc:sldMkLst>
+          <pc:docMk/>
+          <pc:sldMk cId="92626491" sldId="261"/>
+        </pc:sldMkLst>
+        <pc:spChg chg="mod">
+          <ac:chgData name="Thomas Rayner" userId="2a90c881cfb7e9fb" providerId="LiveId" clId="{0FEA48AA-DED2-4F2F-8AB8-DE5F4C76965C}" dt="2018-07-05T20:11:55.244" v="28"/>
+          <ac:spMkLst>
+            <pc:docMk/>
+            <pc:sldMk cId="92626491" sldId="261"/>
+            <ac:spMk id="3" creationId="{00000000-0000-0000-0000-000000000000}"/>
+          </ac:spMkLst>
+        </pc:spChg>
+      </pc:sldChg>
+      <pc:sldChg chg="modSp">
+        <pc:chgData name="Thomas Rayner" userId="2a90c881cfb7e9fb" providerId="LiveId" clId="{0FEA48AA-DED2-4F2F-8AB8-DE5F4C76965C}" dt="2018-07-05T20:11:55.244" v="28"/>
+        <pc:sldMkLst>
+          <pc:docMk/>
+          <pc:sldMk cId="4133264934" sldId="264"/>
+        </pc:sldMkLst>
+        <pc:spChg chg="mod">
+          <ac:chgData name="Thomas Rayner" userId="2a90c881cfb7e9fb" providerId="LiveId" clId="{0FEA48AA-DED2-4F2F-8AB8-DE5F4C76965C}" dt="2018-07-05T20:11:55.244" v="28"/>
+          <ac:spMkLst>
+            <pc:docMk/>
+            <pc:sldMk cId="4133264934" sldId="264"/>
+            <ac:spMk id="3" creationId="{00000000-0000-0000-0000-000000000000}"/>
+          </ac:spMkLst>
+        </pc:spChg>
+      </pc:sldChg>
+      <pc:sldChg chg="modSp">
+        <pc:chgData name="Thomas Rayner" userId="2a90c881cfb7e9fb" providerId="LiveId" clId="{0FEA48AA-DED2-4F2F-8AB8-DE5F4C76965C}" dt="2018-07-05T20:11:55.244" v="28"/>
+        <pc:sldMkLst>
+          <pc:docMk/>
+          <pc:sldMk cId="1580596623" sldId="266"/>
+        </pc:sldMkLst>
+        <pc:spChg chg="mod">
+          <ac:chgData name="Thomas Rayner" userId="2a90c881cfb7e9fb" providerId="LiveId" clId="{0FEA48AA-DED2-4F2F-8AB8-DE5F4C76965C}" dt="2018-07-05T20:11:55.244" v="28"/>
+          <ac:spMkLst>
+            <pc:docMk/>
+            <pc:sldMk cId="1580596623" sldId="266"/>
+            <ac:spMk id="3" creationId="{00000000-0000-0000-0000-000000000000}"/>
+          </ac:spMkLst>
+        </pc:spChg>
+      </pc:sldChg>
+      <pc:sldChg chg="modSp">
+        <pc:chgData name="Thomas Rayner" userId="2a90c881cfb7e9fb" providerId="LiveId" clId="{0FEA48AA-DED2-4F2F-8AB8-DE5F4C76965C}" dt="2018-07-05T20:11:55.244" v="28"/>
+        <pc:sldMkLst>
+          <pc:docMk/>
+          <pc:sldMk cId="906983915" sldId="269"/>
+        </pc:sldMkLst>
+        <pc:spChg chg="mod">
+          <ac:chgData name="Thomas Rayner" userId="2a90c881cfb7e9fb" providerId="LiveId" clId="{0FEA48AA-DED2-4F2F-8AB8-DE5F4C76965C}" dt="2018-07-05T20:11:55.244" v="28"/>
+          <ac:spMkLst>
+            <pc:docMk/>
+            <pc:sldMk cId="906983915" sldId="269"/>
+            <ac:spMk id="3" creationId="{00000000-0000-0000-0000-000000000000}"/>
+          </ac:spMkLst>
+        </pc:spChg>
+      </pc:sldChg>
+      <pc:sldChg chg="modSp">
+        <pc:chgData name="Thomas Rayner" userId="2a90c881cfb7e9fb" providerId="LiveId" clId="{0FEA48AA-DED2-4F2F-8AB8-DE5F4C76965C}" dt="2018-07-05T20:11:55.244" v="28"/>
+        <pc:sldMkLst>
+          <pc:docMk/>
+          <pc:sldMk cId="3728142149" sldId="270"/>
+        </pc:sldMkLst>
+        <pc:spChg chg="mod">
+          <ac:chgData name="Thomas Rayner" userId="2a90c881cfb7e9fb" providerId="LiveId" clId="{0FEA48AA-DED2-4F2F-8AB8-DE5F4C76965C}" dt="2018-07-05T20:11:55.244" v="28"/>
+          <ac:spMkLst>
+            <pc:docMk/>
+            <pc:sldMk cId="3728142149" sldId="270"/>
+            <ac:spMk id="10" creationId="{00000000-0000-0000-0000-000000000000}"/>
+          </ac:spMkLst>
+        </pc:spChg>
+      </pc:sldChg>
+      <pc:sldChg chg="modSp">
+        <pc:chgData name="Thomas Rayner" userId="2a90c881cfb7e9fb" providerId="LiveId" clId="{0FEA48AA-DED2-4F2F-8AB8-DE5F4C76965C}" dt="2018-07-05T20:11:55.244" v="28"/>
+        <pc:sldMkLst>
+          <pc:docMk/>
+          <pc:sldMk cId="1347014903" sldId="271"/>
+        </pc:sldMkLst>
+        <pc:spChg chg="mod">
+          <ac:chgData name="Thomas Rayner" userId="2a90c881cfb7e9fb" providerId="LiveId" clId="{0FEA48AA-DED2-4F2F-8AB8-DE5F4C76965C}" dt="2018-07-05T20:11:55.244" v="28"/>
+          <ac:spMkLst>
+            <pc:docMk/>
+            <pc:sldMk cId="1347014903" sldId="271"/>
+            <ac:spMk id="3" creationId="{00000000-0000-0000-0000-000000000000}"/>
+          </ac:spMkLst>
+        </pc:spChg>
+      </pc:sldChg>
+      <pc:sldChg chg="modSp">
+        <pc:chgData name="Thomas Rayner" userId="2a90c881cfb7e9fb" providerId="LiveId" clId="{0FEA48AA-DED2-4F2F-8AB8-DE5F4C76965C}" dt="2018-07-05T20:11:55.244" v="28"/>
+        <pc:sldMkLst>
+          <pc:docMk/>
+          <pc:sldMk cId="377523897" sldId="272"/>
+        </pc:sldMkLst>
+        <pc:spChg chg="mod">
+          <ac:chgData name="Thomas Rayner" userId="2a90c881cfb7e9fb" providerId="LiveId" clId="{0FEA48AA-DED2-4F2F-8AB8-DE5F4C76965C}" dt="2018-07-05T20:11:55.244" v="28"/>
+          <ac:spMkLst>
+            <pc:docMk/>
+            <pc:sldMk cId="377523897" sldId="272"/>
+            <ac:spMk id="3" creationId="{00000000-0000-0000-0000-000000000000}"/>
+          </ac:spMkLst>
+        </pc:spChg>
+      </pc:sldChg>
+      <pc:sldChg chg="modSp">
+        <pc:chgData name="Thomas Rayner" userId="2a90c881cfb7e9fb" providerId="LiveId" clId="{0FEA48AA-DED2-4F2F-8AB8-DE5F4C76965C}" dt="2018-07-05T20:11:55.244" v="28"/>
+        <pc:sldMkLst>
+          <pc:docMk/>
+          <pc:sldMk cId="498382103" sldId="275"/>
+        </pc:sldMkLst>
+        <pc:spChg chg="mod">
+          <ac:chgData name="Thomas Rayner" userId="2a90c881cfb7e9fb" providerId="LiveId" clId="{0FEA48AA-DED2-4F2F-8AB8-DE5F4C76965C}" dt="2018-07-05T20:11:55.244" v="28"/>
+          <ac:spMkLst>
+            <pc:docMk/>
+            <pc:sldMk cId="498382103" sldId="275"/>
+            <ac:spMk id="3" creationId="{00000000-0000-0000-0000-000000000000}"/>
+          </ac:spMkLst>
+        </pc:spChg>
+      </pc:sldChg>
+      <pc:sldChg chg="modSp">
+        <pc:chgData name="Thomas Rayner" userId="2a90c881cfb7e9fb" providerId="LiveId" clId="{0FEA48AA-DED2-4F2F-8AB8-DE5F4C76965C}" dt="2018-07-05T20:11:55.244" v="28"/>
+        <pc:sldMkLst>
+          <pc:docMk/>
+          <pc:sldMk cId="2347756171" sldId="276"/>
+        </pc:sldMkLst>
+        <pc:spChg chg="mod">
+          <ac:chgData name="Thomas Rayner" userId="2a90c881cfb7e9fb" providerId="LiveId" clId="{0FEA48AA-DED2-4F2F-8AB8-DE5F4C76965C}" dt="2018-07-05T20:11:55.244" v="28"/>
+          <ac:spMkLst>
+            <pc:docMk/>
+            <pc:sldMk cId="2347756171" sldId="276"/>
+            <ac:spMk id="3" creationId="{00000000-0000-0000-0000-000000000000}"/>
+          </ac:spMkLst>
+        </pc:spChg>
+      </pc:sldChg>
+      <pc:sldChg chg="modSp">
+        <pc:chgData name="Thomas Rayner" userId="2a90c881cfb7e9fb" providerId="LiveId" clId="{0FEA48AA-DED2-4F2F-8AB8-DE5F4C76965C}" dt="2018-07-05T20:11:55.244" v="28"/>
+        <pc:sldMkLst>
+          <pc:docMk/>
+          <pc:sldMk cId="3951045565" sldId="277"/>
+        </pc:sldMkLst>
+        <pc:spChg chg="mod">
+          <ac:chgData name="Thomas Rayner" userId="2a90c881cfb7e9fb" providerId="LiveId" clId="{0FEA48AA-DED2-4F2F-8AB8-DE5F4C76965C}" dt="2018-07-05T20:11:55.244" v="28"/>
+          <ac:spMkLst>
+            <pc:docMk/>
+            <pc:sldMk cId="3951045565" sldId="277"/>
+            <ac:spMk id="3" creationId="{00000000-0000-0000-0000-000000000000}"/>
+          </ac:spMkLst>
+        </pc:spChg>
+      </pc:sldChg>
+      <pc:sldChg chg="modSp">
+        <pc:chgData name="Thomas Rayner" userId="2a90c881cfb7e9fb" providerId="LiveId" clId="{0FEA48AA-DED2-4F2F-8AB8-DE5F4C76965C}" dt="2018-07-05T20:11:55.244" v="28"/>
+        <pc:sldMkLst>
+          <pc:docMk/>
+          <pc:sldMk cId="552058327" sldId="279"/>
+        </pc:sldMkLst>
+        <pc:spChg chg="mod">
+          <ac:chgData name="Thomas Rayner" userId="2a90c881cfb7e9fb" providerId="LiveId" clId="{0FEA48AA-DED2-4F2F-8AB8-DE5F4C76965C}" dt="2018-07-05T20:11:55.244" v="28"/>
+          <ac:spMkLst>
+            <pc:docMk/>
+            <pc:sldMk cId="552058327" sldId="279"/>
+            <ac:spMk id="3" creationId="{00000000-0000-0000-0000-000000000000}"/>
+          </ac:spMkLst>
+        </pc:spChg>
+      </pc:sldChg>
+      <pc:sldChg chg="modSp">
+        <pc:chgData name="Thomas Rayner" userId="2a90c881cfb7e9fb" providerId="LiveId" clId="{0FEA48AA-DED2-4F2F-8AB8-DE5F4C76965C}" dt="2018-07-05T20:11:55.244" v="28"/>
+        <pc:sldMkLst>
+          <pc:docMk/>
+          <pc:sldMk cId="3454281086" sldId="280"/>
+        </pc:sldMkLst>
+        <pc:spChg chg="mod">
+          <ac:chgData name="Thomas Rayner" userId="2a90c881cfb7e9fb" providerId="LiveId" clId="{0FEA48AA-DED2-4F2F-8AB8-DE5F4C76965C}" dt="2018-07-05T20:11:55.244" v="28"/>
+          <ac:spMkLst>
+            <pc:docMk/>
+            <pc:sldMk cId="3454281086" sldId="280"/>
+            <ac:spMk id="3" creationId="{00000000-0000-0000-0000-000000000000}"/>
+          </ac:spMkLst>
+        </pc:spChg>
+      </pc:sldChg>
+      <pc:sldChg chg="modSp">
+        <pc:chgData name="Thomas Rayner" userId="2a90c881cfb7e9fb" providerId="LiveId" clId="{0FEA48AA-DED2-4F2F-8AB8-DE5F4C76965C}" dt="2018-07-05T20:11:55.244" v="28"/>
+        <pc:sldMkLst>
+          <pc:docMk/>
+          <pc:sldMk cId="2750922878" sldId="281"/>
+        </pc:sldMkLst>
+        <pc:spChg chg="mod">
+          <ac:chgData name="Thomas Rayner" userId="2a90c881cfb7e9fb" providerId="LiveId" clId="{0FEA48AA-DED2-4F2F-8AB8-DE5F4C76965C}" dt="2018-07-05T20:11:55.244" v="28"/>
+          <ac:spMkLst>
+            <pc:docMk/>
+            <pc:sldMk cId="2750922878" sldId="281"/>
+            <ac:spMk id="2" creationId="{00000000-0000-0000-0000-000000000000}"/>
+          </ac:spMkLst>
+        </pc:spChg>
+      </pc:sldChg>
+      <pc:sldChg chg="modSp">
+        <pc:chgData name="Thomas Rayner" userId="2a90c881cfb7e9fb" providerId="LiveId" clId="{0FEA48AA-DED2-4F2F-8AB8-DE5F4C76965C}" dt="2018-07-05T20:11:55.244" v="28"/>
+        <pc:sldMkLst>
+          <pc:docMk/>
+          <pc:sldMk cId="1070399266" sldId="282"/>
+        </pc:sldMkLst>
+        <pc:spChg chg="mod">
+          <ac:chgData name="Thomas Rayner" userId="2a90c881cfb7e9fb" providerId="LiveId" clId="{0FEA48AA-DED2-4F2F-8AB8-DE5F4C76965C}" dt="2018-07-05T20:11:55.244" v="28"/>
+          <ac:spMkLst>
+            <pc:docMk/>
+            <pc:sldMk cId="1070399266" sldId="282"/>
+            <ac:spMk id="3" creationId="{00000000-0000-0000-0000-000000000000}"/>
+          </ac:spMkLst>
+        </pc:spChg>
+      </pc:sldChg>
+      <pc:sldChg chg="modSp">
+        <pc:chgData name="Thomas Rayner" userId="2a90c881cfb7e9fb" providerId="LiveId" clId="{0FEA48AA-DED2-4F2F-8AB8-DE5F4C76965C}" dt="2018-07-05T20:11:55.244" v="28"/>
+        <pc:sldMkLst>
+          <pc:docMk/>
+          <pc:sldMk cId="2670474591" sldId="284"/>
+        </pc:sldMkLst>
+        <pc:spChg chg="mod">
+          <ac:chgData name="Thomas Rayner" userId="2a90c881cfb7e9fb" providerId="LiveId" clId="{0FEA48AA-DED2-4F2F-8AB8-DE5F4C76965C}" dt="2018-07-05T20:11:55.244" v="28"/>
+          <ac:spMkLst>
+            <pc:docMk/>
+            <pc:sldMk cId="2670474591" sldId="284"/>
+            <ac:spMk id="3" creationId="{00000000-0000-0000-0000-000000000000}"/>
+          </ac:spMkLst>
+        </pc:spChg>
+      </pc:sldChg>
+      <pc:sldChg chg="modSp">
+        <pc:chgData name="Thomas Rayner" userId="2a90c881cfb7e9fb" providerId="LiveId" clId="{0FEA48AA-DED2-4F2F-8AB8-DE5F4C76965C}" dt="2018-07-05T20:11:55.244" v="28"/>
+        <pc:sldMkLst>
+          <pc:docMk/>
+          <pc:sldMk cId="913968392" sldId="285"/>
+        </pc:sldMkLst>
+        <pc:spChg chg="mod">
+          <ac:chgData name="Thomas Rayner" userId="2a90c881cfb7e9fb" providerId="LiveId" clId="{0FEA48AA-DED2-4F2F-8AB8-DE5F4C76965C}" dt="2018-07-05T20:11:55.244" v="28"/>
+          <ac:spMkLst>
+            <pc:docMk/>
+            <pc:sldMk cId="913968392" sldId="285"/>
+            <ac:spMk id="3" creationId="{00000000-0000-0000-0000-000000000000}"/>
+          </ac:spMkLst>
+        </pc:spChg>
+      </pc:sldChg>
+      <pc:sldChg chg="modSp">
+        <pc:chgData name="Thomas Rayner" userId="2a90c881cfb7e9fb" providerId="LiveId" clId="{0FEA48AA-DED2-4F2F-8AB8-DE5F4C76965C}" dt="2018-07-05T20:11:55.244" v="28"/>
+        <pc:sldMkLst>
+          <pc:docMk/>
+          <pc:sldMk cId="2223526758" sldId="287"/>
+        </pc:sldMkLst>
+        <pc:spChg chg="mod">
+          <ac:chgData name="Thomas Rayner" userId="2a90c881cfb7e9fb" providerId="LiveId" clId="{0FEA48AA-DED2-4F2F-8AB8-DE5F4C76965C}" dt="2018-07-05T20:11:55.244" v="28"/>
+          <ac:spMkLst>
+            <pc:docMk/>
+            <pc:sldMk cId="2223526758" sldId="287"/>
+            <ac:spMk id="2" creationId="{00000000-0000-0000-0000-000000000000}"/>
+          </ac:spMkLst>
+        </pc:spChg>
+        <pc:spChg chg="mod">
+          <ac:chgData name="Thomas Rayner" userId="2a90c881cfb7e9fb" providerId="LiveId" clId="{0FEA48AA-DED2-4F2F-8AB8-DE5F4C76965C}" dt="2018-07-05T20:11:55.244" v="28"/>
+          <ac:spMkLst>
+            <pc:docMk/>
+            <pc:sldMk cId="2223526758" sldId="287"/>
+            <ac:spMk id="3" creationId="{00000000-0000-0000-0000-000000000000}"/>
+          </ac:spMkLst>
+        </pc:spChg>
+      </pc:sldChg>
+      <pc:sldChg chg="modSp">
+        <pc:chgData name="Thomas Rayner" userId="2a90c881cfb7e9fb" providerId="LiveId" clId="{0FEA48AA-DED2-4F2F-8AB8-DE5F4C76965C}" dt="2018-07-05T20:11:55.244" v="28"/>
+        <pc:sldMkLst>
+          <pc:docMk/>
+          <pc:sldMk cId="2765710585" sldId="288"/>
+        </pc:sldMkLst>
+        <pc:spChg chg="mod">
+          <ac:chgData name="Thomas Rayner" userId="2a90c881cfb7e9fb" providerId="LiveId" clId="{0FEA48AA-DED2-4F2F-8AB8-DE5F4C76965C}" dt="2018-07-05T20:11:55.244" v="28"/>
+          <ac:spMkLst>
+            <pc:docMk/>
+            <pc:sldMk cId="2765710585" sldId="288"/>
+            <ac:spMk id="3" creationId="{00000000-0000-0000-0000-000000000000}"/>
+          </ac:spMkLst>
+        </pc:spChg>
+      </pc:sldChg>
+      <pc:sldChg chg="modSp">
+        <pc:chgData name="Thomas Rayner" userId="2a90c881cfb7e9fb" providerId="LiveId" clId="{0FEA48AA-DED2-4F2F-8AB8-DE5F4C76965C}" dt="2018-07-05T20:11:55.244" v="28"/>
+        <pc:sldMkLst>
+          <pc:docMk/>
+          <pc:sldMk cId="2670076115" sldId="289"/>
+        </pc:sldMkLst>
+        <pc:spChg chg="mod">
+          <ac:chgData name="Thomas Rayner" userId="2a90c881cfb7e9fb" providerId="LiveId" clId="{0FEA48AA-DED2-4F2F-8AB8-DE5F4C76965C}" dt="2018-07-05T20:11:55.244" v="28"/>
+          <ac:spMkLst>
+            <pc:docMk/>
+            <pc:sldMk cId="2670076115" sldId="289"/>
+            <ac:spMk id="3" creationId="{00000000-0000-0000-0000-000000000000}"/>
+          </ac:spMkLst>
+        </pc:spChg>
+      </pc:sldChg>
+      <pc:sldChg chg="modSp">
+        <pc:chgData name="Thomas Rayner" userId="2a90c881cfb7e9fb" providerId="LiveId" clId="{0FEA48AA-DED2-4F2F-8AB8-DE5F4C76965C}" dt="2018-07-05T20:11:55.244" v="28"/>
+        <pc:sldMkLst>
+          <pc:docMk/>
+          <pc:sldMk cId="1519642217" sldId="290"/>
+        </pc:sldMkLst>
+        <pc:spChg chg="mod">
+          <ac:chgData name="Thomas Rayner" userId="2a90c881cfb7e9fb" providerId="LiveId" clId="{0FEA48AA-DED2-4F2F-8AB8-DE5F4C76965C}" dt="2018-07-05T20:11:55.244" v="28"/>
+          <ac:spMkLst>
+            <pc:docMk/>
+            <pc:sldMk cId="1519642217" sldId="290"/>
+            <ac:spMk id="3" creationId="{00000000-0000-0000-0000-000000000000}"/>
+          </ac:spMkLst>
+        </pc:spChg>
+      </pc:sldChg>
+      <pc:sldChg chg="modSp">
+        <pc:chgData name="Thomas Rayner" userId="2a90c881cfb7e9fb" providerId="LiveId" clId="{0FEA48AA-DED2-4F2F-8AB8-DE5F4C76965C}" dt="2018-07-05T20:11:55.244" v="28"/>
+        <pc:sldMkLst>
+          <pc:docMk/>
+          <pc:sldMk cId="3226697208" sldId="291"/>
+        </pc:sldMkLst>
+        <pc:spChg chg="mod">
+          <ac:chgData name="Thomas Rayner" userId="2a90c881cfb7e9fb" providerId="LiveId" clId="{0FEA48AA-DED2-4F2F-8AB8-DE5F4C76965C}" dt="2018-07-05T20:11:55.244" v="28"/>
+          <ac:spMkLst>
+            <pc:docMk/>
+            <pc:sldMk cId="3226697208" sldId="291"/>
+            <ac:spMk id="3" creationId="{00000000-0000-0000-0000-000000000000}"/>
+          </ac:spMkLst>
+        </pc:spChg>
+      </pc:sldChg>
+      <pc:sldMasterChg chg="modTransition modSldLayout">
+        <pc:chgData name="Thomas Rayner" userId="2a90c881cfb7e9fb" providerId="LiveId" clId="{0FEA48AA-DED2-4F2F-8AB8-DE5F4C76965C}" dt="2018-07-05T20:11:55.244" v="28"/>
+        <pc:sldMasterMkLst>
+          <pc:docMk/>
+          <pc:sldMasterMk cId="3893920037" sldId="2147483662"/>
+        </pc:sldMasterMkLst>
+        <pc:sldLayoutChg chg="addSp modTransition">
+          <pc:chgData name="Thomas Rayner" userId="2a90c881cfb7e9fb" providerId="LiveId" clId="{0FEA48AA-DED2-4F2F-8AB8-DE5F4C76965C}" dt="2018-07-05T20:11:55.244" v="28"/>
+          <pc:sldLayoutMkLst>
+            <pc:docMk/>
+            <pc:sldMasterMk cId="3893920037" sldId="2147483662"/>
+            <pc:sldLayoutMk cId="3135715951" sldId="2147483665"/>
+          </pc:sldLayoutMkLst>
+          <pc:spChg chg="add">
+            <ac:chgData name="Thomas Rayner" userId="2a90c881cfb7e9fb" providerId="LiveId" clId="{0FEA48AA-DED2-4F2F-8AB8-DE5F4C76965C}" dt="2018-07-05T20:10:50.527" v="0"/>
+            <ac:spMkLst>
+              <pc:docMk/>
+              <pc:sldMasterMk cId="3893920037" sldId="2147483662"/>
+              <pc:sldLayoutMk cId="3135715951" sldId="2147483665"/>
+              <ac:spMk id="7" creationId="{99905D8E-2E4D-46AA-ACC3-A85627BE779F}"/>
+            </ac:spMkLst>
+          </pc:spChg>
+          <pc:spChg chg="add">
+            <ac:chgData name="Thomas Rayner" userId="2a90c881cfb7e9fb" providerId="LiveId" clId="{0FEA48AA-DED2-4F2F-8AB8-DE5F4C76965C}" dt="2018-07-05T20:10:50.527" v="0"/>
+            <ac:spMkLst>
+              <pc:docMk/>
+              <pc:sldMasterMk cId="3893920037" sldId="2147483662"/>
+              <pc:sldLayoutMk cId="3135715951" sldId="2147483665"/>
+              <ac:spMk id="8" creationId="{0AFD407B-52EF-418E-A491-DEE66525E75C}"/>
+            </ac:spMkLst>
+          </pc:spChg>
+          <pc:spChg chg="add">
+            <ac:chgData name="Thomas Rayner" userId="2a90c881cfb7e9fb" providerId="LiveId" clId="{0FEA48AA-DED2-4F2F-8AB8-DE5F4C76965C}" dt="2018-07-05T20:10:50.527" v="0"/>
+            <ac:spMkLst>
+              <pc:docMk/>
+              <pc:sldMasterMk cId="3893920037" sldId="2147483662"/>
+              <pc:sldLayoutMk cId="3135715951" sldId="2147483665"/>
+              <ac:spMk id="9" creationId="{FA606748-85C4-4204-A925-E81BB77ED6F5}"/>
+            </ac:spMkLst>
+          </pc:spChg>
+          <pc:spChg chg="add">
+            <ac:chgData name="Thomas Rayner" userId="2a90c881cfb7e9fb" providerId="LiveId" clId="{0FEA48AA-DED2-4F2F-8AB8-DE5F4C76965C}" dt="2018-07-05T20:10:50.527" v="0"/>
+            <ac:spMkLst>
+              <pc:docMk/>
+              <pc:sldMasterMk cId="3893920037" sldId="2147483662"/>
+              <pc:sldLayoutMk cId="3135715951" sldId="2147483665"/>
+              <ac:spMk id="10" creationId="{5B88A094-CBE0-45B3-B916-A8028C5948A0}"/>
+            </ac:spMkLst>
+          </pc:spChg>
+          <pc:spChg chg="add">
+            <ac:chgData name="Thomas Rayner" userId="2a90c881cfb7e9fb" providerId="LiveId" clId="{0FEA48AA-DED2-4F2F-8AB8-DE5F4C76965C}" dt="2018-07-05T20:10:50.527" v="0"/>
+            <ac:spMkLst>
+              <pc:docMk/>
+              <pc:sldMasterMk cId="3893920037" sldId="2147483662"/>
+              <pc:sldLayoutMk cId="3135715951" sldId="2147483665"/>
+              <ac:spMk id="12" creationId="{BFCD40C8-D6D3-4B92-AD7C-AB857F356F65}"/>
+            </ac:spMkLst>
+          </pc:spChg>
+          <pc:spChg chg="add">
+            <ac:chgData name="Thomas Rayner" userId="2a90c881cfb7e9fb" providerId="LiveId" clId="{0FEA48AA-DED2-4F2F-8AB8-DE5F4C76965C}" dt="2018-07-05T20:10:50.527" v="0"/>
+            <ac:spMkLst>
+              <pc:docMk/>
+              <pc:sldMasterMk cId="3893920037" sldId="2147483662"/>
+              <pc:sldLayoutMk cId="3135715951" sldId="2147483665"/>
+              <ac:spMk id="14" creationId="{A8668444-9FC8-426E-BB90-7959EE0F726E}"/>
+            </ac:spMkLst>
+          </pc:spChg>
+          <pc:picChg chg="add">
+            <ac:chgData name="Thomas Rayner" userId="2a90c881cfb7e9fb" providerId="LiveId" clId="{0FEA48AA-DED2-4F2F-8AB8-DE5F4C76965C}" dt="2018-07-05T20:10:50.527" v="0"/>
+            <ac:picMkLst>
+              <pc:docMk/>
+              <pc:sldMasterMk cId="3893920037" sldId="2147483662"/>
+              <pc:sldLayoutMk cId="3135715951" sldId="2147483665"/>
+              <ac:picMk id="11" creationId="{3768C55B-C22E-429B-87A0-68C3E0663C13}"/>
+            </ac:picMkLst>
+          </pc:picChg>
+          <pc:picChg chg="add">
+            <ac:chgData name="Thomas Rayner" userId="2a90c881cfb7e9fb" providerId="LiveId" clId="{0FEA48AA-DED2-4F2F-8AB8-DE5F4C76965C}" dt="2018-07-05T20:10:50.527" v="0"/>
+            <ac:picMkLst>
+              <pc:docMk/>
+              <pc:sldMasterMk cId="3893920037" sldId="2147483662"/>
+              <pc:sldLayoutMk cId="3135715951" sldId="2147483665"/>
+              <ac:picMk id="13" creationId="{40759412-E375-41A8-B01A-32A121431003}"/>
+            </ac:picMkLst>
+          </pc:picChg>
+          <pc:picChg chg="add">
+            <ac:chgData name="Thomas Rayner" userId="2a90c881cfb7e9fb" providerId="LiveId" clId="{0FEA48AA-DED2-4F2F-8AB8-DE5F4C76965C}" dt="2018-07-05T20:10:50.527" v="0"/>
+            <ac:picMkLst>
+              <pc:docMk/>
+              <pc:sldMasterMk cId="3893920037" sldId="2147483662"/>
+              <pc:sldLayoutMk cId="3135715951" sldId="2147483665"/>
+              <ac:picMk id="15" creationId="{42B73762-E552-48B0-9A3F-2D5B08D3D62F}"/>
+            </ac:picMkLst>
+          </pc:picChg>
+          <pc:picChg chg="add">
+            <ac:chgData name="Thomas Rayner" userId="2a90c881cfb7e9fb" providerId="LiveId" clId="{0FEA48AA-DED2-4F2F-8AB8-DE5F4C76965C}" dt="2018-07-05T20:10:50.527" v="0"/>
+            <ac:picMkLst>
+              <pc:docMk/>
+              <pc:sldMasterMk cId="3893920037" sldId="2147483662"/>
+              <pc:sldLayoutMk cId="3135715951" sldId="2147483665"/>
+              <ac:picMk id="16" creationId="{A05992BF-F207-4027-B027-EAA3E0348622}"/>
+            </ac:picMkLst>
+          </pc:picChg>
+        </pc:sldLayoutChg>
+        <pc:sldLayoutChg chg="addSp modTransition">
+          <pc:chgData name="Thomas Rayner" userId="2a90c881cfb7e9fb" providerId="LiveId" clId="{0FEA48AA-DED2-4F2F-8AB8-DE5F4C76965C}" dt="2018-07-05T20:11:55.244" v="28"/>
+          <pc:sldLayoutMkLst>
+            <pc:docMk/>
+            <pc:sldMasterMk cId="3893920037" sldId="2147483662"/>
+            <pc:sldLayoutMk cId="721491376" sldId="2147483669"/>
+          </pc:sldLayoutMkLst>
+          <pc:spChg chg="add">
+            <ac:chgData name="Thomas Rayner" userId="2a90c881cfb7e9fb" providerId="LiveId" clId="{0FEA48AA-DED2-4F2F-8AB8-DE5F4C76965C}" dt="2018-07-05T20:10:50.527" v="0"/>
+            <ac:spMkLst>
+              <pc:docMk/>
+              <pc:sldMasterMk cId="3893920037" sldId="2147483662"/>
+              <pc:sldLayoutMk cId="721491376" sldId="2147483669"/>
+              <ac:spMk id="5" creationId="{E87E868A-B6A4-4D76-BD1F-B11390A5C815}"/>
+            </ac:spMkLst>
+          </pc:spChg>
+          <pc:spChg chg="add">
+            <ac:chgData name="Thomas Rayner" userId="2a90c881cfb7e9fb" providerId="LiveId" clId="{0FEA48AA-DED2-4F2F-8AB8-DE5F4C76965C}" dt="2018-07-05T20:10:50.527" v="0"/>
+            <ac:spMkLst>
+              <pc:docMk/>
+              <pc:sldMasterMk cId="3893920037" sldId="2147483662"/>
+              <pc:sldLayoutMk cId="721491376" sldId="2147483669"/>
+              <ac:spMk id="6" creationId="{CACC15EA-7CFE-4BCA-87E4-76982C00E760}"/>
+            </ac:spMkLst>
+          </pc:spChg>
+        </pc:sldLayoutChg>
+      </pc:sldMasterChg>
+    </pc:docChg>
+  </pc:docChgLst>
+</pc:chgInfo>
 </file>
 
 <file path=ppt/ink/ink1.xml><?xml version="1.0" encoding="utf-8"?>
@@ -1416,7 +1945,7 @@
           <a:p>
             <a:fld id="{53A7D609-A91D-4E1B-A3FA-4CE5623A91C8}" type="datetimeFigureOut">
               <a:rPr lang="pt-BR" smtClean="0"/>
-              <a:t>02/11/2016</a:t>
+              <a:t>05/07/2018</a:t>
             </a:fld>
             <a:endParaRPr lang="pt-BR" dirty="0"/>
           </a:p>
@@ -3646,7 +4175,7 @@
           <a:p>
             <a:fld id="{E90E3BD1-B73B-43E4-A4D1-9229F8DDBABB}" type="datetimeFigureOut">
               <a:rPr lang="pt-BR" smtClean="0"/>
-              <a:t>02/11/2016</a:t>
+              <a:t>05/07/2018</a:t>
             </a:fld>
             <a:endParaRPr lang="pt-BR" dirty="0"/>
           </a:p>
@@ -3848,7 +4377,7 @@
           <a:p>
             <a:fld id="{E90E3BD1-B73B-43E4-A4D1-9229F8DDBABB}" type="datetimeFigureOut">
               <a:rPr lang="pt-BR" smtClean="0"/>
-              <a:t>02/11/2016</a:t>
+              <a:t>05/07/2018</a:t>
             </a:fld>
             <a:endParaRPr lang="pt-BR" dirty="0"/>
           </a:p>
@@ -4049,7 +4578,7 @@
           <a:p>
             <a:fld id="{E90E3BD1-B73B-43E4-A4D1-9229F8DDBABB}" type="datetimeFigureOut">
               <a:rPr lang="pt-BR" smtClean="0"/>
-              <a:t>02/11/2016</a:t>
+              <a:t>05/07/2018</a:t>
             </a:fld>
             <a:endParaRPr lang="pt-BR" dirty="0"/>
           </a:p>
@@ -8565,7 +9094,7 @@
           <a:p>
             <a:pPr algn="ctr"/>
             <a:r>
-              <a:rPr lang="en-US" sz="4000" dirty="0" smtClean="0">
+              <a:rPr lang="en-US" sz="4000" dirty="0">
                 <a:ln w="0"/>
                 <a:solidFill>
                   <a:srgbClr val="0A64A1"/>
@@ -8576,15 +9105,6 @@
               </a:rPr>
               <a:t>One problem with this one</a:t>
             </a:r>
-            <a:endParaRPr lang="en-US" sz="4000" dirty="0">
-              <a:ln w="0"/>
-              <a:solidFill>
-                <a:srgbClr val="0A64A1"/>
-              </a:solidFill>
-              <a:effectLst>
-                <a:reflection blurRad="6350" stA="53000" endA="300" endPos="35500" dir="5400000" sy="-90000" algn="bl" rotWithShape="0"/>
-              </a:effectLst>
-            </a:endParaRPr>
           </a:p>
         </p:txBody>
       </p:sp>
@@ -9796,10 +10316,9 @@
           <a:lstStyle/>
           <a:p>
             <a:r>
-              <a:rPr lang="en-US" dirty="0" smtClean="0"/>
+              <a:rPr lang="en-US" dirty="0"/>
               <a:t>Brackets</a:t>
             </a:r>
-            <a:endParaRPr lang="en-US" dirty="0"/>
           </a:p>
         </p:txBody>
       </p:sp>
@@ -9822,7 +10341,7 @@
               <a:buNone/>
             </a:pPr>
             <a:r>
-              <a:rPr lang="en-US" dirty="0" smtClean="0"/>
+              <a:rPr lang="en-US" dirty="0"/>
               <a:t>Consider these two examples – should return 5, 4, 3, 2, 1 </a:t>
             </a:r>
           </a:p>
@@ -9831,7 +10350,7 @@
               <a:buNone/>
             </a:pPr>
             <a:r>
-              <a:rPr lang="en-US" sz="2000" dirty="0" smtClean="0">
+              <a:rPr lang="en-US" sz="2000" dirty="0">
                 <a:solidFill>
                   <a:srgbClr val="800080"/>
                 </a:solidFill>
@@ -9919,7 +10438,7 @@
               <a:buNone/>
             </a:pPr>
             <a:r>
-              <a:rPr lang="en-US" sz="2000" dirty="0" smtClean="0">
+              <a:rPr lang="en-US" sz="2000" dirty="0">
                 <a:solidFill>
                   <a:prstClr val="black"/>
                 </a:solidFill>
@@ -9968,33 +10487,13 @@
               <a:t> </a:t>
             </a:r>
             <a:r>
-              <a:rPr lang="en-US" sz="2000" dirty="0" smtClean="0">
+              <a:rPr lang="en-US" sz="2000" dirty="0">
                 <a:solidFill>
                   <a:srgbClr val="FF4500"/>
                 </a:solidFill>
                 <a:latin typeface="Lucida Console" panose="020B0609040504020204" pitchFamily="49" charset="0"/>
               </a:rPr>
               <a:t>$_</a:t>
-            </a:r>
-            <a:endParaRPr lang="en-US" sz="2000" dirty="0" smtClean="0">
-              <a:solidFill>
-                <a:prstClr val="black"/>
-              </a:solidFill>
-              <a:latin typeface="Lucida Console" panose="020B0609040504020204" pitchFamily="49" charset="0"/>
-            </a:endParaRPr>
-          </a:p>
-          <a:p>
-            <a:pPr marL="0" indent="0">
-              <a:buNone/>
-            </a:pPr>
-            <a:r>
-              <a:rPr lang="en-US" sz="2000" dirty="0" smtClean="0">
-                <a:solidFill>
-                  <a:prstClr val="black"/>
-                </a:solidFill>
-                <a:latin typeface="Lucida Console" panose="020B0609040504020204" pitchFamily="49" charset="0"/>
-              </a:rPr>
-              <a:t>} </a:t>
             </a:r>
             <a:endParaRPr lang="en-US" sz="2000" dirty="0">
               <a:solidFill>
@@ -10008,153 +10507,158 @@
               <a:buNone/>
             </a:pPr>
             <a:r>
-              <a:rPr lang="en-US" sz="2000" dirty="0" smtClean="0"/>
-              <a:t>Returns 1, 2, 3, 4, 5</a:t>
+              <a:rPr lang="en-US" sz="2000" dirty="0">
+                <a:solidFill>
+                  <a:prstClr val="black"/>
+                </a:solidFill>
+                <a:latin typeface="Lucida Console" panose="020B0609040504020204" pitchFamily="49" charset="0"/>
+              </a:rPr>
+              <a:t>} </a:t>
             </a:r>
           </a:p>
           <a:p>
             <a:pPr marL="0" indent="0">
               <a:buNone/>
             </a:pPr>
-            <a:endParaRPr lang="en-US" sz="2000" dirty="0" smtClean="0"/>
+            <a:r>
+              <a:rPr lang="en-US" sz="2000" dirty="0"/>
+              <a:t>Returns 1, 2, 3, 4, 5</a:t>
+            </a:r>
           </a:p>
           <a:p>
             <a:pPr marL="0" indent="0">
               <a:buNone/>
             </a:pPr>
-            <a:r>
-              <a:rPr lang="en-US" sz="2000" dirty="0" smtClean="0">
-                <a:solidFill>
-                  <a:srgbClr val="800080"/>
-                </a:solidFill>
-                <a:latin typeface="Lucida Console" panose="020B0609040504020204" pitchFamily="49" charset="0"/>
-              </a:rPr>
-              <a:t>1</a:t>
-            </a:r>
-            <a:r>
-              <a:rPr lang="en-US" sz="2000" dirty="0">
-                <a:solidFill>
-                  <a:srgbClr val="A9A9A9"/>
-                </a:solidFill>
-                <a:latin typeface="Lucida Console" panose="020B0609040504020204" pitchFamily="49" charset="0"/>
-              </a:rPr>
-              <a:t>..</a:t>
-            </a:r>
-            <a:r>
-              <a:rPr lang="en-US" sz="2000" dirty="0">
-                <a:solidFill>
-                  <a:srgbClr val="800080"/>
-                </a:solidFill>
-                <a:latin typeface="Lucida Console" panose="020B0609040504020204" pitchFamily="49" charset="0"/>
-              </a:rPr>
-              <a:t>5</a:t>
-            </a:r>
-            <a:r>
-              <a:rPr lang="en-US" sz="2000" dirty="0">
-                <a:solidFill>
-                  <a:prstClr val="black"/>
-                </a:solidFill>
-                <a:latin typeface="Lucida Console" panose="020B0609040504020204" pitchFamily="49" charset="0"/>
-              </a:rPr>
-              <a:t> </a:t>
-            </a:r>
-            <a:r>
-              <a:rPr lang="en-US" sz="2000" dirty="0">
-                <a:solidFill>
-                  <a:srgbClr val="A9A9A9"/>
-                </a:solidFill>
-                <a:latin typeface="Lucida Console" panose="020B0609040504020204" pitchFamily="49" charset="0"/>
-              </a:rPr>
-              <a:t>|</a:t>
-            </a:r>
-            <a:r>
-              <a:rPr lang="en-US" sz="2000" dirty="0">
-                <a:solidFill>
-                  <a:prstClr val="black"/>
-                </a:solidFill>
-                <a:latin typeface="Lucida Console" panose="020B0609040504020204" pitchFamily="49" charset="0"/>
-              </a:rPr>
-              <a:t> </a:t>
-            </a:r>
-            <a:r>
-              <a:rPr lang="en-US" sz="2000" dirty="0">
-                <a:solidFill>
-                  <a:srgbClr val="0000FF"/>
-                </a:solidFill>
-                <a:latin typeface="Lucida Console" panose="020B0609040504020204" pitchFamily="49" charset="0"/>
-              </a:rPr>
-              <a:t>sort</a:t>
-            </a:r>
-            <a:r>
-              <a:rPr lang="en-US" sz="2000" dirty="0">
-                <a:solidFill>
-                  <a:prstClr val="black"/>
-                </a:solidFill>
-                <a:latin typeface="Lucida Console" panose="020B0609040504020204" pitchFamily="49" charset="0"/>
-              </a:rPr>
-              <a:t> { </a:t>
-            </a:r>
+            <a:endParaRPr lang="en-US" sz="2000" dirty="0"/>
           </a:p>
           <a:p>
             <a:pPr marL="0" indent="0">
               <a:buNone/>
             </a:pPr>
             <a:r>
+              <a:rPr lang="en-US" sz="2000" dirty="0">
+                <a:solidFill>
+                  <a:srgbClr val="800080"/>
+                </a:solidFill>
+                <a:latin typeface="Lucida Console" panose="020B0609040504020204" pitchFamily="49" charset="0"/>
+              </a:rPr>
+              <a:t>1</a:t>
+            </a:r>
+            <a:r>
+              <a:rPr lang="en-US" sz="2000" dirty="0">
+                <a:solidFill>
+                  <a:srgbClr val="A9A9A9"/>
+                </a:solidFill>
+                <a:latin typeface="Lucida Console" panose="020B0609040504020204" pitchFamily="49" charset="0"/>
+              </a:rPr>
+              <a:t>..</a:t>
+            </a:r>
+            <a:r>
+              <a:rPr lang="en-US" sz="2000" dirty="0">
+                <a:solidFill>
+                  <a:srgbClr val="800080"/>
+                </a:solidFill>
+                <a:latin typeface="Lucida Console" panose="020B0609040504020204" pitchFamily="49" charset="0"/>
+              </a:rPr>
+              <a:t>5</a:t>
+            </a:r>
+            <a:r>
+              <a:rPr lang="en-US" sz="2000" dirty="0">
+                <a:solidFill>
+                  <a:prstClr val="black"/>
+                </a:solidFill>
+                <a:latin typeface="Lucida Console" panose="020B0609040504020204" pitchFamily="49" charset="0"/>
+              </a:rPr>
+              <a:t> </a:t>
+            </a:r>
+            <a:r>
+              <a:rPr lang="en-US" sz="2000" dirty="0">
+                <a:solidFill>
+                  <a:srgbClr val="A9A9A9"/>
+                </a:solidFill>
+                <a:latin typeface="Lucida Console" panose="020B0609040504020204" pitchFamily="49" charset="0"/>
+              </a:rPr>
+              <a:t>|</a:t>
+            </a:r>
+            <a:r>
+              <a:rPr lang="en-US" sz="2000" dirty="0">
+                <a:solidFill>
+                  <a:prstClr val="black"/>
+                </a:solidFill>
+                <a:latin typeface="Lucida Console" panose="020B0609040504020204" pitchFamily="49" charset="0"/>
+              </a:rPr>
+              <a:t> </a:t>
+            </a:r>
+            <a:r>
+              <a:rPr lang="en-US" sz="2000" dirty="0">
+                <a:solidFill>
+                  <a:srgbClr val="0000FF"/>
+                </a:solidFill>
+                <a:latin typeface="Lucida Console" panose="020B0609040504020204" pitchFamily="49" charset="0"/>
+              </a:rPr>
+              <a:t>sort</a:t>
+            </a:r>
+            <a:r>
+              <a:rPr lang="en-US" sz="2000" dirty="0">
+                <a:solidFill>
+                  <a:prstClr val="black"/>
+                </a:solidFill>
+                <a:latin typeface="Lucida Console" panose="020B0609040504020204" pitchFamily="49" charset="0"/>
+              </a:rPr>
+              <a:t> { </a:t>
+            </a:r>
+          </a:p>
+          <a:p>
+            <a:pPr marL="0" indent="0">
+              <a:buNone/>
+            </a:pPr>
+            <a:r>
               <a:rPr lang="en-US" sz="2000">
                 <a:solidFill>
                   <a:prstClr val="black"/>
                 </a:solidFill>
                 <a:latin typeface="Lucida Console" panose="020B0609040504020204" pitchFamily="49" charset="0"/>
               </a:rPr>
+              <a:t>    </a:t>
+            </a:r>
+            <a:r>
+              <a:rPr lang="en-US" sz="2000">
+                <a:solidFill>
+                  <a:srgbClr val="800080"/>
+                </a:solidFill>
+                <a:latin typeface="Lucida Console" panose="020B0609040504020204" pitchFamily="49" charset="0"/>
+              </a:rPr>
+              <a:t>10</a:t>
+            </a:r>
+            <a:r>
+              <a:rPr lang="en-US" sz="2000">
+                <a:solidFill>
+                  <a:prstClr val="black"/>
+                </a:solidFill>
+                <a:latin typeface="Lucida Console" panose="020B0609040504020204" pitchFamily="49" charset="0"/>
+              </a:rPr>
               <a:t> </a:t>
             </a:r>
             <a:r>
-              <a:rPr lang="en-US" sz="2000" smtClean="0">
+              <a:rPr lang="en-US" sz="2000">
+                <a:solidFill>
+                  <a:srgbClr val="A9A9A9"/>
+                </a:solidFill>
+                <a:latin typeface="Lucida Console" panose="020B0609040504020204" pitchFamily="49" charset="0"/>
+              </a:rPr>
+              <a:t>-</a:t>
+            </a:r>
+            <a:r>
+              <a:rPr lang="en-US" sz="2000">
                 <a:solidFill>
                   <a:prstClr val="black"/>
                 </a:solidFill>
                 <a:latin typeface="Lucida Console" panose="020B0609040504020204" pitchFamily="49" charset="0"/>
               </a:rPr>
-              <a:t>   </a:t>
-            </a:r>
-            <a:r>
-              <a:rPr lang="en-US" sz="2000" smtClean="0">
-                <a:solidFill>
-                  <a:srgbClr val="800080"/>
-                </a:solidFill>
-                <a:latin typeface="Lucida Console" panose="020B0609040504020204" pitchFamily="49" charset="0"/>
-              </a:rPr>
-              <a:t>10</a:t>
-            </a:r>
-            <a:r>
-              <a:rPr lang="en-US" sz="2000" smtClean="0">
-                <a:solidFill>
-                  <a:prstClr val="black"/>
-                </a:solidFill>
-                <a:latin typeface="Lucida Console" panose="020B0609040504020204" pitchFamily="49" charset="0"/>
-              </a:rPr>
               <a:t> </a:t>
             </a:r>
             <a:r>
               <a:rPr lang="en-US" sz="2000">
-                <a:solidFill>
-                  <a:srgbClr val="A9A9A9"/>
-                </a:solidFill>
-                <a:latin typeface="Lucida Console" panose="020B0609040504020204" pitchFamily="49" charset="0"/>
-              </a:rPr>
-              <a:t>-</a:t>
-            </a:r>
-            <a:r>
-              <a:rPr lang="en-US" sz="2000">
-                <a:solidFill>
-                  <a:prstClr val="black"/>
-                </a:solidFill>
-                <a:latin typeface="Lucida Console" panose="020B0609040504020204" pitchFamily="49" charset="0"/>
-              </a:rPr>
-              <a:t> </a:t>
-            </a:r>
-            <a:r>
-              <a:rPr lang="en-US" sz="2000" smtClean="0">
                 <a:solidFill>
                   <a:srgbClr val="FF4500"/>
                 </a:solidFill>
@@ -10188,10 +10692,9 @@
               <a:buNone/>
             </a:pPr>
             <a:r>
-              <a:rPr lang="en-US" sz="2000" dirty="0" smtClean="0"/>
+              <a:rPr lang="en-US" sz="2000" dirty="0"/>
               <a:t>Returns 5, 4, 3, 2, 1</a:t>
             </a:r>
-            <a:endParaRPr lang="en-US" sz="2000" dirty="0"/>
           </a:p>
         </p:txBody>
       </p:sp>
@@ -10861,13 +11364,6 @@
   <p:transition spd="slow">
     <p:push dir="u"/>
   </p:transition>
-  <p:timing>
-    <p:tnLst>
-      <p:par>
-        <p:cTn id="1" dur="indefinite" restart="never" nodeType="tmRoot"/>
-      </p:par>
-    </p:tnLst>
-  </p:timing>
 </p:sld>
 </file>
 
@@ -42136,15 +42632,6 @@
 </file>
 
 <file path=customXml/item1.xml><?xml version="1.0" encoding="utf-8"?>
-<?mso-contentType ?>
-<FormTemplates xmlns="http://schemas.microsoft.com/sharepoint/v3/contenttype/forms">
-  <Display>DocumentLibraryForm</Display>
-  <Edit>DocumentLibraryForm</Edit>
-  <New>DocumentLibraryForm</New>
-</FormTemplates>
-</file>
-
-<file path=customXml/item2.xml><?xml version="1.0" encoding="utf-8"?>
 <ct:contentTypeSchema xmlns:ct="http://schemas.microsoft.com/office/2006/metadata/contentType" xmlns:ma="http://schemas.microsoft.com/office/2006/metadata/properties/metaAttributes" ct:_="" ma:_="" ma:contentTypeName="Document" ma:contentTypeID="0x01010060267313E1B2794D8DFC61F74010DBEE" ma:contentTypeVersion="8" ma:contentTypeDescription="Create a new document." ma:contentTypeScope="" ma:versionID="f4e215a75bec290b0ec03485a3e906d1">
   <xsd:schema xmlns:xsd="http://www.w3.org/2001/XMLSchema" xmlns:xs="http://www.w3.org/2001/XMLSchema" xmlns:p="http://schemas.microsoft.com/office/2006/metadata/properties" xmlns:ns1="http://schemas.microsoft.com/sharepoint/v3" xmlns:ns2="bf70c230-8171-4481-8194-457be27ef1d6" xmlns:ns3="http://schemas.microsoft.com/sharepoint/v4" targetNamespace="http://schemas.microsoft.com/office/2006/metadata/properties" ma:root="true" ma:fieldsID="ac4d8bd04630ae57f88384a943c43a01" ns1:_="" ns2:_="" ns3:_="">
     <xsd:import namespace="http://schemas.microsoft.com/sharepoint/v3"/>
@@ -42326,6 +42813,15 @@
 </ct:contentTypeSchema>
 </file>
 
+<file path=customXml/item2.xml><?xml version="1.0" encoding="utf-8"?>
+<?mso-contentType ?>
+<FormTemplates xmlns="http://schemas.microsoft.com/sharepoint/v3/contenttype/forms">
+  <Display>DocumentLibraryForm</Display>
+  <Edit>DocumentLibraryForm</Edit>
+  <New>DocumentLibraryForm</New>
+</FormTemplates>
+</file>
+
 <file path=customXml/item3.xml><?xml version="1.0" encoding="utf-8"?>
 <p:properties xmlns:p="http://schemas.microsoft.com/office/2006/metadata/properties" xmlns:xsi="http://www.w3.org/2001/XMLSchema-instance" xmlns:pc="http://schemas.microsoft.com/office/infopath/2007/PartnerControls">
   <documentManagement>
@@ -42344,14 +42840,6 @@
 </file>
 
 <file path=customXml/itemProps1.xml><?xml version="1.0" encoding="utf-8"?>
-<ds:datastoreItem xmlns:ds="http://schemas.openxmlformats.org/officeDocument/2006/customXml" ds:itemID="{6F75B063-F2EF-452A-9185-332547351C32}">
-  <ds:schemaRefs>
-    <ds:schemaRef ds:uri="http://schemas.microsoft.com/sharepoint/v3/contenttype/forms"/>
-  </ds:schemaRefs>
-</ds:datastoreItem>
-</file>
-
-<file path=customXml/itemProps2.xml><?xml version="1.0" encoding="utf-8"?>
 <ds:datastoreItem xmlns:ds="http://schemas.openxmlformats.org/officeDocument/2006/customXml" ds:itemID="{9026A169-9589-4EF7-AEDD-E4100B558181}">
   <ds:schemaRefs>
     <ds:schemaRef ds:uri="http://schemas.microsoft.com/office/2006/metadata/contentType"/>
@@ -42371,6 +42859,14 @@
 </ds:datastoreItem>
 </file>
 
+<file path=customXml/itemProps2.xml><?xml version="1.0" encoding="utf-8"?>
+<ds:datastoreItem xmlns:ds="http://schemas.openxmlformats.org/officeDocument/2006/customXml" ds:itemID="{6F75B063-F2EF-452A-9185-332547351C32}">
+  <ds:schemaRefs>
+    <ds:schemaRef ds:uri="http://schemas.microsoft.com/sharepoint/v3/contenttype/forms"/>
+  </ds:schemaRefs>
+</ds:datastoreItem>
+</file>
+
 <file path=customXml/itemProps3.xml><?xml version="1.0" encoding="utf-8"?>
 <ds:datastoreItem xmlns:ds="http://schemas.openxmlformats.org/officeDocument/2006/customXml" ds:itemID="{FE3D1619-06B9-4A5A-909B-DA79C0DB6ACA}">
   <ds:schemaRefs>

</xml_diff>